<commit_message>
Updated intro slide to say 2019 instead of 2018.
</commit_message>
<xml_diff>
--- a/2019/misc/intro.pptx
+++ b/2019/misc/intro.pptx
@@ -126,6 +126,22 @@
       </a:defRPr>
     </a:lvl9pPr>
   </p:defaultTextStyle>
+  <p:extLst>
+    <p:ext uri="{EFAFB233-063F-42B5-8137-9DF3F51BA10A}">
+      <p15:sldGuideLst xmlns:p15="http://schemas.microsoft.com/office/powerpoint/2012/main">
+        <p15:guide id="1" orient="horz" pos="3072">
+          <p15:clr>
+            <a:srgbClr val="A4A3A4"/>
+          </p15:clr>
+        </p15:guide>
+        <p15:guide id="2" pos="4096">
+          <p15:clr>
+            <a:srgbClr val="A4A3A4"/>
+          </p15:clr>
+        </p15:guide>
+      </p15:sldGuideLst>
+    </p:ext>
+  </p:extLst>
 </p:presentation>
 </file>
 
@@ -729,7 +745,7 @@
   <p:clrMapOvr>
     <a:masterClrMapping/>
   </p:clrMapOvr>
-  <p:transition xmlns:p14="http://schemas.microsoft.com/office/powerpoint/2010/main" spd="med"/>
+  <p:transition spd="med"/>
 </p:sldLayout>
 </file>
 
@@ -755,7 +771,7 @@
   <p:clrMapOvr>
     <a:masterClrMapping/>
   </p:clrMapOvr>
-  <p:transition xmlns:p14="http://schemas.microsoft.com/office/powerpoint/2010/main" spd="med"/>
+  <p:transition spd="med"/>
 </p:sldLayout>
 </file>
 
@@ -781,7 +797,7 @@
   <p:clrMapOvr>
     <a:masterClrMapping/>
   </p:clrMapOvr>
-  <p:transition xmlns:p14="http://schemas.microsoft.com/office/powerpoint/2010/main" spd="med"/>
+  <p:transition spd="med"/>
 </p:sldLayout>
 </file>
 
@@ -815,7 +831,7 @@
   <p:clrMapOvr>
     <a:masterClrMapping/>
   </p:clrMapOvr>
-  <p:transition xmlns:p14="http://schemas.microsoft.com/office/powerpoint/2010/main" spd="med"/>
+  <p:transition spd="med"/>
 </p:sldLayout>
 </file>
 
@@ -1047,7 +1063,7 @@
   <p:clrMapOvr>
     <a:masterClrMapping/>
   </p:clrMapOvr>
-  <p:transition xmlns:p14="http://schemas.microsoft.com/office/powerpoint/2010/main" spd="med"/>
+  <p:transition spd="med"/>
 </p:sldLayout>
 </file>
 
@@ -1114,7 +1130,7 @@
   <p:clrMapOvr>
     <a:masterClrMapping/>
   </p:clrMapOvr>
-  <p:transition xmlns:p14="http://schemas.microsoft.com/office/powerpoint/2010/main" spd="med"/>
+  <p:transition spd="med"/>
 </p:sldLayout>
 </file>
 
@@ -1346,7 +1362,7 @@
   <p:clrMapOvr>
     <a:masterClrMapping/>
   </p:clrMapOvr>
-  <p:transition xmlns:p14="http://schemas.microsoft.com/office/powerpoint/2010/main" spd="med"/>
+  <p:transition spd="med"/>
 </p:sldLayout>
 </file>
 
@@ -1409,7 +1425,7 @@
   <p:clrMapOvr>
     <a:masterClrMapping/>
   </p:clrMapOvr>
-  <p:transition xmlns:p14="http://schemas.microsoft.com/office/powerpoint/2010/main" spd="med"/>
+  <p:transition spd="med"/>
 </p:sldLayout>
 </file>
 
@@ -1577,7 +1593,7 @@
   <p:clrMapOvr>
     <a:masterClrMapping/>
   </p:clrMapOvr>
-  <p:transition xmlns:p14="http://schemas.microsoft.com/office/powerpoint/2010/main" spd="med"/>
+  <p:transition spd="med"/>
 </p:sldLayout>
 </file>
 
@@ -1795,7 +1811,7 @@
   <p:clrMapOvr>
     <a:masterClrMapping/>
   </p:clrMapOvr>
-  <p:transition xmlns:p14="http://schemas.microsoft.com/office/powerpoint/2010/main" spd="med"/>
+  <p:transition spd="med"/>
 </p:sldLayout>
 </file>
 
@@ -1930,7 +1946,7 @@
   <p:clrMapOvr>
     <a:masterClrMapping/>
   </p:clrMapOvr>
-  <p:transition xmlns:p14="http://schemas.microsoft.com/office/powerpoint/2010/main" spd="med"/>
+  <p:transition spd="med"/>
 </p:sldLayout>
 </file>
 
@@ -1956,7 +1972,7 @@
   <p:clrMapOvr>
     <a:masterClrMapping/>
   </p:clrMapOvr>
-  <p:transition xmlns:p14="http://schemas.microsoft.com/office/powerpoint/2010/main" spd="med"/>
+  <p:transition spd="med"/>
 </p:sldLayout>
 </file>
 
@@ -2012,7 +2028,7 @@
           </a:ln>
           <a:extLst>
             <a:ext uri="{C572A759-6A51-4108-AA02-DFA0A04FC94B}">
-              <ma14:wrappingTextBoxFlag xmlns:ma14="http://schemas.microsoft.com/office/mac/drawingml/2011/main" val="1"/>
+              <ma14:wrappingTextBoxFlag xmlns:ma14="http://schemas.microsoft.com/office/mac/drawingml/2011/main" xmlns="" val="1"/>
             </a:ext>
           </a:extLst>
         </p:spPr>
@@ -2063,7 +2079,7 @@
           </a:ln>
           <a:extLst>
             <a:ext uri="{C572A759-6A51-4108-AA02-DFA0A04FC94B}">
-              <ma14:wrappingTextBoxFlag xmlns:ma14="http://schemas.microsoft.com/office/mac/drawingml/2011/main" val="1"/>
+              <ma14:wrappingTextBoxFlag xmlns:ma14="http://schemas.microsoft.com/office/mac/drawingml/2011/main" xmlns="" val="1"/>
             </a:ext>
           </a:extLst>
         </p:spPr>
@@ -2176,7 +2192,7 @@
     <p:sldLayoutId id="2147483660" r:id="rId11"/>
     <p:sldLayoutId id="2147483661" r:id="rId12"/>
   </p:sldLayoutIdLst>
-  <p:transition xmlns:p14="http://schemas.microsoft.com/office/powerpoint/2010/main" spd="med"/>
+  <p:transition spd="med"/>
   <p:txStyles>
     <p:titleStyle>
       <a:lvl1pPr algn="ctr" defTabSz="584200">
@@ -2701,7 +2717,7 @@
                   <a:srgbClr val="535353"/>
                 </a:solidFill>
               </a:rPr>
-              <a:t>18</a:t>
+              <a:t>19</a:t>
             </a:r>
             <a:endParaRPr sz="3800" dirty="0">
               <a:solidFill>
@@ -2716,11 +2732,11 @@
   <p:clrMapOvr>
     <a:masterClrMapping/>
   </p:clrMapOvr>
-  <p:transition xmlns:p14="http://schemas.microsoft.com/office/powerpoint/2010/main" spd="med"/>
+  <p:transition spd="med"/>
   <p:timing>
     <p:tnLst>
       <p:par>
-        <p:cTn xmlns:p14="http://schemas.microsoft.com/office/powerpoint/2010/main" id="1" dur="indefinite" restart="never" nodeType="tmRoot"/>
+        <p:cTn id="1" dur="indefinite" restart="never" nodeType="tmRoot"/>
       </p:par>
     </p:tnLst>
   </p:timing>
@@ -2981,11 +2997,11 @@
   <p:clrMapOvr>
     <a:masterClrMapping/>
   </p:clrMapOvr>
-  <p:transition xmlns:p14="http://schemas.microsoft.com/office/powerpoint/2010/main" spd="med"/>
+  <p:transition spd="med"/>
   <p:timing>
     <p:tnLst>
       <p:par>
-        <p:cTn xmlns:p14="http://schemas.microsoft.com/office/powerpoint/2010/main" id="1" dur="indefinite" restart="never" nodeType="tmRoot"/>
+        <p:cTn id="1" dur="indefinite" restart="never" nodeType="tmRoot"/>
       </p:par>
     </p:tnLst>
   </p:timing>
@@ -3090,11 +3106,11 @@
   <p:clrMapOvr>
     <a:masterClrMapping/>
   </p:clrMapOvr>
-  <p:transition xmlns:p14="http://schemas.microsoft.com/office/powerpoint/2010/main" spd="med"/>
+  <p:transition spd="med"/>
   <p:timing>
     <p:tnLst>
       <p:par>
-        <p:cTn xmlns:p14="http://schemas.microsoft.com/office/powerpoint/2010/main" id="1" dur="indefinite" restart="never" nodeType="tmRoot"/>
+        <p:cTn id="1" dur="indefinite" restart="never" nodeType="tmRoot"/>
       </p:par>
     </p:tnLst>
   </p:timing>
@@ -3174,11 +3190,11 @@
   <p:clrMapOvr>
     <a:masterClrMapping/>
   </p:clrMapOvr>
-  <p:transition xmlns:p14="http://schemas.microsoft.com/office/powerpoint/2010/main" spd="med"/>
+  <p:transition spd="med"/>
   <p:timing>
     <p:tnLst>
       <p:par>
-        <p:cTn xmlns:p14="http://schemas.microsoft.com/office/powerpoint/2010/main" id="1" dur="indefinite" restart="never" nodeType="tmRoot"/>
+        <p:cTn id="1" dur="indefinite" restart="never" nodeType="tmRoot"/>
       </p:par>
     </p:tnLst>
   </p:timing>
@@ -3270,11 +3286,11 @@
   <p:clrMapOvr>
     <a:masterClrMapping/>
   </p:clrMapOvr>
-  <p:transition xmlns:p14="http://schemas.microsoft.com/office/powerpoint/2010/main" spd="med"/>
+  <p:transition spd="med"/>
   <p:timing>
     <p:tnLst>
       <p:par>
-        <p:cTn xmlns:p14="http://schemas.microsoft.com/office/powerpoint/2010/main" id="1" dur="indefinite" restart="never" nodeType="tmRoot"/>
+        <p:cTn id="1" dur="indefinite" restart="never" nodeType="tmRoot"/>
       </p:par>
     </p:tnLst>
   </p:timing>
@@ -3480,11 +3496,11 @@
   <p:clrMapOvr>
     <a:masterClrMapping/>
   </p:clrMapOvr>
-  <p:transition xmlns:p14="http://schemas.microsoft.com/office/powerpoint/2010/main" spd="med"/>
+  <p:transition spd="med"/>
   <p:timing>
     <p:tnLst>
       <p:par>
-        <p:cTn xmlns:p14="http://schemas.microsoft.com/office/powerpoint/2010/main" id="1" dur="indefinite" restart="never" nodeType="tmRoot"/>
+        <p:cTn id="1" dur="indefinite" restart="never" nodeType="tmRoot"/>
       </p:par>
     </p:tnLst>
   </p:timing>
@@ -3557,7 +3573,7 @@
           </a:ln>
           <a:extLst>
             <a:ext uri="{C572A759-6A51-4108-AA02-DFA0A04FC94B}">
-              <ma14:wrappingTextBoxFlag xmlns:ma14="http://schemas.microsoft.com/office/mac/drawingml/2011/main" val="1"/>
+              <ma14:wrappingTextBoxFlag xmlns:ma14="http://schemas.microsoft.com/office/mac/drawingml/2011/main" xmlns="" val="1"/>
             </a:ext>
           </a:extLst>
         </p:spPr>
@@ -3681,11 +3697,11 @@
   <p:clrMapOvr>
     <a:masterClrMapping/>
   </p:clrMapOvr>
-  <p:transition xmlns:p14="http://schemas.microsoft.com/office/powerpoint/2010/main" spd="med"/>
+  <p:transition spd="med"/>
   <p:timing>
     <p:tnLst>
       <p:par>
-        <p:cTn xmlns:p14="http://schemas.microsoft.com/office/powerpoint/2010/main" id="1" dur="indefinite" restart="never" nodeType="tmRoot"/>
+        <p:cTn id="1" dur="indefinite" restart="never" nodeType="tmRoot"/>
       </p:par>
     </p:tnLst>
   </p:timing>
@@ -3752,7 +3768,7 @@
           </a:ln>
           <a:extLst>
             <a:ext uri="{C572A759-6A51-4108-AA02-DFA0A04FC94B}">
-              <ma14:wrappingTextBoxFlag xmlns:ma14="http://schemas.microsoft.com/office/mac/drawingml/2011/main" val="1"/>
+              <ma14:wrappingTextBoxFlag xmlns:ma14="http://schemas.microsoft.com/office/mac/drawingml/2011/main" xmlns="" val="1"/>
             </a:ext>
           </a:extLst>
         </p:spPr>
@@ -3881,11 +3897,11 @@
   <p:clrMapOvr>
     <a:masterClrMapping/>
   </p:clrMapOvr>
-  <p:transition xmlns:p14="http://schemas.microsoft.com/office/powerpoint/2010/main" spd="med"/>
+  <p:transition spd="med"/>
   <p:timing>
     <p:tnLst>
       <p:par>
-        <p:cTn xmlns:p14="http://schemas.microsoft.com/office/powerpoint/2010/main" id="1" dur="indefinite" restart="never" nodeType="tmRoot"/>
+        <p:cTn id="1" dur="indefinite" restart="never" nodeType="tmRoot"/>
       </p:par>
     </p:tnLst>
   </p:timing>
@@ -3958,7 +3974,7 @@
           </a:ln>
           <a:extLst>
             <a:ext uri="{C572A759-6A51-4108-AA02-DFA0A04FC94B}">
-              <ma14:wrappingTextBoxFlag xmlns:ma14="http://schemas.microsoft.com/office/mac/drawingml/2011/main" val="1"/>
+              <ma14:wrappingTextBoxFlag xmlns:ma14="http://schemas.microsoft.com/office/mac/drawingml/2011/main" xmlns="" val="1"/>
             </a:ext>
           </a:extLst>
         </p:spPr>
@@ -4111,11 +4127,11 @@
   <p:clrMapOvr>
     <a:masterClrMapping/>
   </p:clrMapOvr>
-  <p:transition xmlns:p14="http://schemas.microsoft.com/office/powerpoint/2010/main" spd="med"/>
+  <p:transition spd="med"/>
   <p:timing>
     <p:tnLst>
       <p:par>
-        <p:cTn xmlns:p14="http://schemas.microsoft.com/office/powerpoint/2010/main" id="1" dur="indefinite" restart="never" nodeType="tmRoot"/>
+        <p:cTn id="1" dur="indefinite" restart="never" nodeType="tmRoot"/>
       </p:par>
     </p:tnLst>
   </p:timing>
@@ -4193,7 +4209,7 @@
         </p:spPr>
         <p:txBody>
           <a:bodyPr>
-            <a:normAutofit lnSpcReduction="10000"/>
+            <a:normAutofit/>
           </a:bodyPr>
           <a:lstStyle/>
           <a:p>
@@ -4305,11 +4321,11 @@
   <p:clrMapOvr>
     <a:masterClrMapping/>
   </p:clrMapOvr>
-  <p:transition xmlns:p14="http://schemas.microsoft.com/office/powerpoint/2010/main" spd="med"/>
+  <p:transition spd="med"/>
   <p:timing>
     <p:tnLst>
       <p:par>
-        <p:cTn xmlns:p14="http://schemas.microsoft.com/office/powerpoint/2010/main" id="1" dur="indefinite" restart="never" nodeType="tmRoot"/>
+        <p:cTn id="1" dur="indefinite" restart="never" nodeType="tmRoot"/>
       </p:par>
     </p:tnLst>
   </p:timing>
@@ -4368,7 +4384,9 @@
         </p:nvSpPr>
         <p:spPr/>
         <p:txBody>
-          <a:bodyPr/>
+          <a:bodyPr>
+            <a:normAutofit lnSpcReduction="10000"/>
+          </a:bodyPr>
           <a:lstStyle/>
           <a:p>
             <a:r>
@@ -4413,11 +4431,11 @@
   <p:clrMapOvr>
     <a:masterClrMapping/>
   </p:clrMapOvr>
-  <p:transition xmlns:p14="http://schemas.microsoft.com/office/powerpoint/2010/main" spd="med"/>
+  <p:transition spd="med"/>
   <p:timing>
     <p:tnLst>
       <p:par>
-        <p:cTn xmlns:p14="http://schemas.microsoft.com/office/powerpoint/2010/main" id="1" dur="indefinite" restart="never" nodeType="tmRoot"/>
+        <p:cTn id="1" dur="indefinite" restart="never" nodeType="tmRoot"/>
       </p:par>
     </p:tnLst>
   </p:timing>
@@ -4595,11 +4613,11 @@
   <p:clrMapOvr>
     <a:masterClrMapping/>
   </p:clrMapOvr>
-  <p:transition xmlns:p14="http://schemas.microsoft.com/office/powerpoint/2010/main" spd="med"/>
+  <p:transition spd="med"/>
   <p:timing>
     <p:tnLst>
       <p:par>
-        <p:cTn xmlns:p14="http://schemas.microsoft.com/office/powerpoint/2010/main" id="1" dur="indefinite" restart="never" nodeType="tmRoot"/>
+        <p:cTn id="1" dur="indefinite" restart="never" nodeType="tmRoot"/>
       </p:par>
     </p:tnLst>
   </p:timing>
@@ -4711,11 +4729,11 @@
   <p:clrMapOvr>
     <a:masterClrMapping/>
   </p:clrMapOvr>
-  <p:transition xmlns:p14="http://schemas.microsoft.com/office/powerpoint/2010/main" spd="med"/>
+  <p:transition spd="med"/>
   <p:timing>
     <p:tnLst>
       <p:par>
-        <p:cTn xmlns:p14="http://schemas.microsoft.com/office/powerpoint/2010/main" id="1" dur="indefinite" restart="never" nodeType="tmRoot"/>
+        <p:cTn id="1" dur="indefinite" restart="never" nodeType="tmRoot"/>
       </p:par>
     </p:tnLst>
   </p:timing>
@@ -4881,11 +4899,11 @@
   <p:clrMapOvr>
     <a:masterClrMapping/>
   </p:clrMapOvr>
-  <p:transition xmlns:p14="http://schemas.microsoft.com/office/powerpoint/2010/main" spd="med"/>
+  <p:transition spd="med"/>
   <p:timing>
     <p:tnLst>
       <p:par>
-        <p:cTn xmlns:p14="http://schemas.microsoft.com/office/powerpoint/2010/main" id="1" dur="indefinite" restart="never" nodeType="tmRoot"/>
+        <p:cTn id="1" dur="indefinite" restart="never" nodeType="tmRoot"/>
       </p:par>
     </p:tnLst>
   </p:timing>

</xml_diff>